<commit_message>
added some texts to the report, and a glass FSM figure
</commit_message>
<xml_diff>
--- a/doc/figure.pptx
+++ b/doc/figure.pptx
@@ -6,6 +6,7 @@
   </p:sldMasterIdLst>
   <p:sldIdLst>
     <p:sldId id="256" r:id="rId2"/>
+    <p:sldId id="258" r:id="rId3"/>
   </p:sldIdLst>
   <p:sldSz cx="9144000" cy="6858000" type="screen4x3"/>
   <p:notesSz cx="6858000" cy="9144000"/>
@@ -288,7 +289,7 @@
           <a:p>
             <a:fld id="{227C77D9-2F34-3648-A7DB-6FF6A52DD5C8}" type="datetimeFigureOut">
               <a:rPr lang="en-US" smtClean="0"/>
-              <a:t>5/4/13</a:t>
+              <a:t>5/5/13</a:t>
             </a:fld>
             <a:endParaRPr lang="en-US"/>
           </a:p>
@@ -458,7 +459,7 @@
           <a:p>
             <a:fld id="{227C77D9-2F34-3648-A7DB-6FF6A52DD5C8}" type="datetimeFigureOut">
               <a:rPr lang="en-US" smtClean="0"/>
-              <a:t>5/4/13</a:t>
+              <a:t>5/5/13</a:t>
             </a:fld>
             <a:endParaRPr lang="en-US"/>
           </a:p>
@@ -638,7 +639,7 @@
           <a:p>
             <a:fld id="{227C77D9-2F34-3648-A7DB-6FF6A52DD5C8}" type="datetimeFigureOut">
               <a:rPr lang="en-US" smtClean="0"/>
-              <a:t>5/4/13</a:t>
+              <a:t>5/5/13</a:t>
             </a:fld>
             <a:endParaRPr lang="en-US"/>
           </a:p>
@@ -808,7 +809,7 @@
           <a:p>
             <a:fld id="{227C77D9-2F34-3648-A7DB-6FF6A52DD5C8}" type="datetimeFigureOut">
               <a:rPr lang="en-US" smtClean="0"/>
-              <a:t>5/4/13</a:t>
+              <a:t>5/5/13</a:t>
             </a:fld>
             <a:endParaRPr lang="en-US"/>
           </a:p>
@@ -1054,7 +1055,7 @@
           <a:p>
             <a:fld id="{227C77D9-2F34-3648-A7DB-6FF6A52DD5C8}" type="datetimeFigureOut">
               <a:rPr lang="en-US" smtClean="0"/>
-              <a:t>5/4/13</a:t>
+              <a:t>5/5/13</a:t>
             </a:fld>
             <a:endParaRPr lang="en-US"/>
           </a:p>
@@ -1342,7 +1343,7 @@
           <a:p>
             <a:fld id="{227C77D9-2F34-3648-A7DB-6FF6A52DD5C8}" type="datetimeFigureOut">
               <a:rPr lang="en-US" smtClean="0"/>
-              <a:t>5/4/13</a:t>
+              <a:t>5/5/13</a:t>
             </a:fld>
             <a:endParaRPr lang="en-US"/>
           </a:p>
@@ -1764,7 +1765,7 @@
           <a:p>
             <a:fld id="{227C77D9-2F34-3648-A7DB-6FF6A52DD5C8}" type="datetimeFigureOut">
               <a:rPr lang="en-US" smtClean="0"/>
-              <a:t>5/4/13</a:t>
+              <a:t>5/5/13</a:t>
             </a:fld>
             <a:endParaRPr lang="en-US"/>
           </a:p>
@@ -1882,7 +1883,7 @@
           <a:p>
             <a:fld id="{227C77D9-2F34-3648-A7DB-6FF6A52DD5C8}" type="datetimeFigureOut">
               <a:rPr lang="en-US" smtClean="0"/>
-              <a:t>5/4/13</a:t>
+              <a:t>5/5/13</a:t>
             </a:fld>
             <a:endParaRPr lang="en-US"/>
           </a:p>
@@ -1977,7 +1978,7 @@
           <a:p>
             <a:fld id="{227C77D9-2F34-3648-A7DB-6FF6A52DD5C8}" type="datetimeFigureOut">
               <a:rPr lang="en-US" smtClean="0"/>
-              <a:t>5/4/13</a:t>
+              <a:t>5/5/13</a:t>
             </a:fld>
             <a:endParaRPr lang="en-US"/>
           </a:p>
@@ -2254,7 +2255,7 @@
           <a:p>
             <a:fld id="{227C77D9-2F34-3648-A7DB-6FF6A52DD5C8}" type="datetimeFigureOut">
               <a:rPr lang="en-US" smtClean="0"/>
-              <a:t>5/4/13</a:t>
+              <a:t>5/5/13</a:t>
             </a:fld>
             <a:endParaRPr lang="en-US"/>
           </a:p>
@@ -2507,7 +2508,7 @@
           <a:p>
             <a:fld id="{227C77D9-2F34-3648-A7DB-6FF6A52DD5C8}" type="datetimeFigureOut">
               <a:rPr lang="en-US" smtClean="0"/>
-              <a:t>5/4/13</a:t>
+              <a:t>5/5/13</a:t>
             </a:fld>
             <a:endParaRPr lang="en-US"/>
           </a:p>
@@ -2720,7 +2721,7 @@
           <a:p>
             <a:fld id="{227C77D9-2F34-3648-A7DB-6FF6A52DD5C8}" type="datetimeFigureOut">
               <a:rPr lang="en-US" smtClean="0"/>
-              <a:t>5/4/13</a:t>
+              <a:t>5/5/13</a:t>
             </a:fld>
             <a:endParaRPr lang="en-US"/>
           </a:p>
@@ -3103,7 +3104,7 @@
         </p:nvSpPr>
         <p:spPr>
           <a:xfrm>
-            <a:off x="617425" y="680465"/>
+            <a:off x="420592" y="597375"/>
             <a:ext cx="2727177" cy="1216417"/>
           </a:xfrm>
           <a:prstGeom prst="roundRect">
@@ -3169,7 +3170,7 @@
         </p:nvSpPr>
         <p:spPr>
           <a:xfrm>
-            <a:off x="6255852" y="680465"/>
+            <a:off x="6059019" y="597375"/>
             <a:ext cx="2727177" cy="1216417"/>
           </a:xfrm>
           <a:prstGeom prst="roundRect">
@@ -3237,7 +3238,7 @@
         </p:nvGrpSpPr>
         <p:grpSpPr>
           <a:xfrm>
-            <a:off x="2289353" y="3239215"/>
+            <a:off x="2812812" y="3156125"/>
             <a:ext cx="5186816" cy="3457793"/>
             <a:chOff x="2450324" y="3665253"/>
             <a:chExt cx="4167338" cy="3192747"/>
@@ -3337,46 +3338,6 @@
           </p:txBody>
         </p:sp>
       </p:grpSp>
-      <p:cxnSp>
-        <p:nvCxnSpPr>
-          <p:cNvPr id="12" name="Straight Arrow Connector 11"/>
-          <p:cNvCxnSpPr>
-            <a:stCxn id="5" idx="2"/>
-          </p:cNvCxnSpPr>
-          <p:nvPr/>
-        </p:nvCxnSpPr>
-        <p:spPr>
-          <a:xfrm>
-            <a:off x="1981014" y="1896882"/>
-            <a:ext cx="438388" cy="1342333"/>
-          </a:xfrm>
-          <a:prstGeom prst="straightConnector1">
-            <a:avLst/>
-          </a:prstGeom>
-          <a:ln w="76200" cmpd="sng">
-            <a:solidFill>
-              <a:schemeClr val="bg1">
-                <a:lumMod val="65000"/>
-              </a:schemeClr>
-            </a:solidFill>
-            <a:tailEnd type="arrow"/>
-          </a:ln>
-        </p:spPr>
-        <p:style>
-          <a:lnRef idx="2">
-            <a:schemeClr val="accent1"/>
-          </a:lnRef>
-          <a:fillRef idx="0">
-            <a:schemeClr val="accent1"/>
-          </a:fillRef>
-          <a:effectRef idx="1">
-            <a:schemeClr val="accent1"/>
-          </a:effectRef>
-          <a:fontRef idx="minor">
-            <a:schemeClr val="tx1"/>
-          </a:fontRef>
-        </p:style>
-      </p:cxnSp>
       <p:sp>
         <p:nvSpPr>
           <p:cNvPr id="15" name="TextBox 14"/>
@@ -3385,7 +3346,7 @@
         </p:nvSpPr>
         <p:spPr>
           <a:xfrm>
-            <a:off x="2289353" y="2081395"/>
+            <a:off x="1816498" y="2199818"/>
             <a:ext cx="1607293" cy="769441"/>
           </a:xfrm>
           <a:prstGeom prst="rect">
@@ -3462,7 +3423,7 @@
         </p:nvSpPr>
         <p:spPr>
           <a:xfrm>
-            <a:off x="5173978" y="5215545"/>
+            <a:off x="6059019" y="4901426"/>
             <a:ext cx="1562739" cy="1216417"/>
           </a:xfrm>
           <a:prstGeom prst="roundRect">
@@ -3531,7 +3492,7 @@
         </p:nvCxnSpPr>
         <p:spPr>
           <a:xfrm flipH="1">
-            <a:off x="3344602" y="1288674"/>
+            <a:off x="3147769" y="1205584"/>
             <a:ext cx="2911250" cy="0"/>
           </a:xfrm>
           <a:prstGeom prst="straightConnector1">
@@ -3569,7 +3530,7 @@
         </p:nvSpPr>
         <p:spPr>
           <a:xfrm>
-            <a:off x="3750666" y="519473"/>
+            <a:off x="3553833" y="436383"/>
             <a:ext cx="2505186" cy="1107996"/>
           </a:xfrm>
           <a:prstGeom prst="rect">
@@ -3622,44 +3583,6 @@
           </a:p>
         </p:txBody>
       </p:sp>
-      <p:cxnSp>
-        <p:nvCxnSpPr>
-          <p:cNvPr id="24" name="Straight Arrow Connector 23"/>
-          <p:cNvCxnSpPr/>
-          <p:nvPr/>
-        </p:nvCxnSpPr>
-        <p:spPr>
-          <a:xfrm flipH="1" flipV="1">
-            <a:off x="1412960" y="1896883"/>
-            <a:ext cx="876393" cy="2938706"/>
-          </a:xfrm>
-          <a:prstGeom prst="straightConnector1">
-            <a:avLst/>
-          </a:prstGeom>
-          <a:ln w="76200" cmpd="sng">
-            <a:solidFill>
-              <a:schemeClr val="bg1">
-                <a:lumMod val="65000"/>
-              </a:schemeClr>
-            </a:solidFill>
-            <a:tailEnd type="arrow"/>
-          </a:ln>
-        </p:spPr>
-        <p:style>
-          <a:lnRef idx="2">
-            <a:schemeClr val="accent1"/>
-          </a:lnRef>
-          <a:fillRef idx="0">
-            <a:schemeClr val="accent1"/>
-          </a:fillRef>
-          <a:effectRef idx="1">
-            <a:schemeClr val="accent1"/>
-          </a:effectRef>
-          <a:fontRef idx="minor">
-            <a:schemeClr val="tx1"/>
-          </a:fontRef>
-        </p:style>
-      </p:cxnSp>
       <p:sp>
         <p:nvSpPr>
           <p:cNvPr id="29" name="TextBox 28"/>
@@ -3668,7 +3591,7 @@
         </p:nvSpPr>
         <p:spPr>
           <a:xfrm>
-            <a:off x="0" y="2850836"/>
+            <a:off x="745918" y="4927162"/>
             <a:ext cx="1957826" cy="430887"/>
           </a:xfrm>
           <a:prstGeom prst="rect">
@@ -3706,47 +3629,6 @@
           </a:p>
         </p:txBody>
       </p:sp>
-      <p:cxnSp>
-        <p:nvCxnSpPr>
-          <p:cNvPr id="30" name="Straight Arrow Connector 29"/>
-          <p:cNvCxnSpPr>
-            <a:stCxn id="33" idx="5"/>
-            <a:endCxn id="16" idx="0"/>
-          </p:cNvCxnSpPr>
-          <p:nvPr/>
-        </p:nvCxnSpPr>
-        <p:spPr>
-          <a:xfrm>
-            <a:off x="3539779" y="4621334"/>
-            <a:ext cx="2415569" cy="594211"/>
-          </a:xfrm>
-          <a:prstGeom prst="straightConnector1">
-            <a:avLst/>
-          </a:prstGeom>
-          <a:ln w="76200" cmpd="sng">
-            <a:solidFill>
-              <a:schemeClr val="bg1">
-                <a:lumMod val="65000"/>
-              </a:schemeClr>
-            </a:solidFill>
-            <a:tailEnd type="arrow"/>
-          </a:ln>
-        </p:spPr>
-        <p:style>
-          <a:lnRef idx="2">
-            <a:schemeClr val="accent1"/>
-          </a:lnRef>
-          <a:fillRef idx="0">
-            <a:schemeClr val="accent1"/>
-          </a:fillRef>
-          <a:effectRef idx="1">
-            <a:schemeClr val="accent1"/>
-          </a:effectRef>
-          <a:fontRef idx="minor">
-            <a:schemeClr val="tx1"/>
-          </a:fontRef>
-        </p:style>
-      </p:cxnSp>
       <p:sp>
         <p:nvSpPr>
           <p:cNvPr id="33" name="Oval 32"/>
@@ -3755,7 +3637,7 @@
         </p:nvSpPr>
         <p:spPr>
           <a:xfrm>
-            <a:off x="3068580" y="4150135"/>
+            <a:off x="2871747" y="4067045"/>
             <a:ext cx="552044" cy="552044"/>
           </a:xfrm>
           <a:prstGeom prst="ellipse">
@@ -3805,7 +3687,7 @@
         </p:nvSpPr>
         <p:spPr>
           <a:xfrm>
-            <a:off x="3985242" y="4004762"/>
+            <a:off x="4757544" y="3562433"/>
             <a:ext cx="2270610" cy="769441"/>
           </a:xfrm>
           <a:prstGeom prst="rect">
@@ -3867,19 +3749,88 @@
           </a:p>
         </p:txBody>
       </p:sp>
+      <p:sp>
+        <p:nvSpPr>
+          <p:cNvPr id="39" name="TextBox 38"/>
+          <p:cNvSpPr txBox="1"/>
+          <p:nvPr/>
+        </p:nvSpPr>
+        <p:spPr>
+          <a:xfrm>
+            <a:off x="3246700" y="5546197"/>
+            <a:ext cx="2812319" cy="769441"/>
+          </a:xfrm>
+          <a:prstGeom prst="rect">
+            <a:avLst/>
+          </a:prstGeom>
+          <a:noFill/>
+        </p:spPr>
+        <p:txBody>
+          <a:bodyPr wrap="square" rtlCol="0">
+            <a:spAutoFit/>
+          </a:bodyPr>
+          <a:lstStyle/>
+          <a:p>
+            <a:r>
+              <a:rPr lang="en-US" sz="2200" dirty="0" smtClean="0">
+                <a:latin typeface="Segoe Light"/>
+                <a:cs typeface="Segoe Light"/>
+              </a:rPr>
+              <a:t>e: </a:t>
+            </a:r>
+            <a:r>
+              <a:rPr lang="en-US" sz="2200" dirty="0" err="1" smtClean="0">
+                <a:latin typeface="Segoe Light"/>
+                <a:cs typeface="Segoe Light"/>
+              </a:rPr>
+              <a:t>XBee</a:t>
+            </a:r>
+            <a:r>
+              <a:rPr lang="en-US" sz="2200" dirty="0" smtClean="0">
+                <a:latin typeface="Segoe Light"/>
+                <a:cs typeface="Segoe Light"/>
+              </a:rPr>
+              <a:t> </a:t>
+            </a:r>
+            <a:r>
+              <a:rPr lang="en-US" altLang="zh-CN" sz="2200" dirty="0" smtClean="0">
+                <a:latin typeface="Segoe Light"/>
+                <a:cs typeface="Segoe Light"/>
+              </a:rPr>
+              <a:t>Verify Others</a:t>
+            </a:r>
+            <a:endParaRPr lang="en-US" sz="2200" dirty="0" smtClean="0">
+              <a:latin typeface="Segoe Light"/>
+              <a:cs typeface="Segoe Light"/>
+            </a:endParaRPr>
+          </a:p>
+          <a:p>
+            <a:r>
+              <a:rPr lang="en-US" sz="2200" dirty="0" smtClean="0">
+                <a:latin typeface="Segoe Light"/>
+                <a:cs typeface="Segoe Light"/>
+              </a:rPr>
+              <a:t>a: Blink Slower</a:t>
+            </a:r>
+            <a:endParaRPr lang="en-US" sz="2200" dirty="0">
+              <a:latin typeface="Segoe Light"/>
+              <a:cs typeface="Segoe Light"/>
+            </a:endParaRPr>
+          </a:p>
+        </p:txBody>
+      </p:sp>
       <p:cxnSp>
         <p:nvCxnSpPr>
-          <p:cNvPr id="36" name="Straight Arrow Connector 35"/>
+          <p:cNvPr id="42" name="Straight Arrow Connector 41"/>
           <p:cNvCxnSpPr>
-            <a:stCxn id="16" idx="1"/>
-            <a:endCxn id="33" idx="4"/>
+            <a:endCxn id="9" idx="2"/>
           </p:cNvCxnSpPr>
           <p:nvPr/>
         </p:nvCxnSpPr>
         <p:spPr>
-          <a:xfrm flipH="1" flipV="1">
-            <a:off x="3344602" y="4702179"/>
-            <a:ext cx="1829376" cy="1121575"/>
+          <a:xfrm flipV="1">
+            <a:off x="7422608" y="1813792"/>
+            <a:ext cx="0" cy="1342333"/>
           </a:xfrm>
           <a:prstGeom prst="straightConnector1">
             <a:avLst/>
@@ -3910,14 +3861,14 @@
       </p:cxnSp>
       <p:sp>
         <p:nvSpPr>
-          <p:cNvPr id="39" name="TextBox 38"/>
+          <p:cNvPr id="46" name="TextBox 45"/>
           <p:cNvSpPr txBox="1"/>
           <p:nvPr/>
         </p:nvSpPr>
         <p:spPr>
           <a:xfrm>
-            <a:off x="2353920" y="5510585"/>
-            <a:ext cx="2812319" cy="769441"/>
+            <a:off x="5291926" y="2112151"/>
+            <a:ext cx="2450323" cy="769441"/>
           </a:xfrm>
           <a:prstGeom prst="rect">
             <a:avLst/>
@@ -3956,7 +3907,7 @@
                 <a:latin typeface="Segoe Light"/>
                 <a:cs typeface="Segoe Light"/>
               </a:rPr>
-              <a:t>Verify Others</a:t>
+              <a:t>Connect</a:t>
             </a:r>
             <a:endParaRPr lang="en-US" sz="2200" dirty="0" smtClean="0">
               <a:latin typeface="Segoe Light"/>
@@ -3969,7 +3920,7 @@
                 <a:latin typeface="Segoe Light"/>
                 <a:cs typeface="Segoe Light"/>
               </a:rPr>
-              <a:t>a: Blink Slower</a:t>
+              <a:t>a: Status LED on</a:t>
             </a:r>
             <a:endParaRPr lang="en-US" sz="2200" dirty="0">
               <a:latin typeface="Segoe Light"/>
@@ -3980,16 +3931,334 @@
       </p:sp>
       <p:cxnSp>
         <p:nvCxnSpPr>
-          <p:cNvPr id="42" name="Straight Arrow Connector 41"/>
+          <p:cNvPr id="21" name="Elbow Connector 20"/>
           <p:cNvCxnSpPr>
-            <a:endCxn id="9" idx="2"/>
+            <a:stCxn id="8" idx="1"/>
           </p:cNvCxnSpPr>
           <p:nvPr/>
         </p:nvCxnSpPr>
         <p:spPr>
-          <a:xfrm flipV="1">
-            <a:off x="7064801" y="1896882"/>
-            <a:ext cx="554640" cy="1342333"/>
+          <a:xfrm rot="10800000">
+            <a:off x="942648" y="1813792"/>
+            <a:ext cx="1870164" cy="3071230"/>
+          </a:xfrm>
+          <a:prstGeom prst="bentConnector2">
+            <a:avLst/>
+          </a:prstGeom>
+          <a:ln w="76200" cmpd="sng">
+            <a:solidFill>
+              <a:srgbClr val="A6A6A6"/>
+            </a:solidFill>
+            <a:tailEnd type="arrow"/>
+          </a:ln>
+        </p:spPr>
+        <p:style>
+          <a:lnRef idx="2">
+            <a:schemeClr val="accent1"/>
+          </a:lnRef>
+          <a:fillRef idx="0">
+            <a:schemeClr val="accent1"/>
+          </a:fillRef>
+          <a:effectRef idx="1">
+            <a:schemeClr val="accent1"/>
+          </a:effectRef>
+          <a:fontRef idx="minor">
+            <a:schemeClr val="tx1"/>
+          </a:fontRef>
+        </p:style>
+      </p:cxnSp>
+      <p:cxnSp>
+        <p:nvCxnSpPr>
+          <p:cNvPr id="37" name="Elbow Connector 36"/>
+          <p:cNvCxnSpPr>
+            <a:stCxn id="33" idx="6"/>
+            <a:endCxn id="16" idx="0"/>
+          </p:cNvCxnSpPr>
+          <p:nvPr/>
+        </p:nvCxnSpPr>
+        <p:spPr>
+          <a:xfrm>
+            <a:off x="3423791" y="4343067"/>
+            <a:ext cx="3416598" cy="558359"/>
+          </a:xfrm>
+          <a:prstGeom prst="bentConnector2">
+            <a:avLst/>
+          </a:prstGeom>
+          <a:ln w="76200" cmpd="sng">
+            <a:solidFill>
+              <a:srgbClr val="A6A6A6"/>
+            </a:solidFill>
+            <a:tailEnd type="arrow"/>
+          </a:ln>
+        </p:spPr>
+        <p:style>
+          <a:lnRef idx="2">
+            <a:schemeClr val="accent1"/>
+          </a:lnRef>
+          <a:fillRef idx="0">
+            <a:schemeClr val="accent1"/>
+          </a:fillRef>
+          <a:effectRef idx="1">
+            <a:schemeClr val="accent1"/>
+          </a:effectRef>
+          <a:fontRef idx="minor">
+            <a:schemeClr val="tx1"/>
+          </a:fontRef>
+        </p:style>
+      </p:cxnSp>
+      <p:cxnSp>
+        <p:nvCxnSpPr>
+          <p:cNvPr id="38" name="Elbow Connector 37"/>
+          <p:cNvCxnSpPr>
+            <a:stCxn id="16" idx="1"/>
+            <a:endCxn id="33" idx="4"/>
+          </p:cNvCxnSpPr>
+          <p:nvPr/>
+        </p:nvCxnSpPr>
+        <p:spPr>
+          <a:xfrm rot="10800000">
+            <a:off x="3147769" y="4619089"/>
+            <a:ext cx="2911250" cy="890546"/>
+          </a:xfrm>
+          <a:prstGeom prst="bentConnector2">
+            <a:avLst/>
+          </a:prstGeom>
+          <a:ln w="76200" cmpd="sng">
+            <a:solidFill>
+              <a:srgbClr val="A6A6A6"/>
+            </a:solidFill>
+            <a:tailEnd type="arrow"/>
+          </a:ln>
+        </p:spPr>
+        <p:style>
+          <a:lnRef idx="2">
+            <a:schemeClr val="accent1"/>
+          </a:lnRef>
+          <a:fillRef idx="0">
+            <a:schemeClr val="accent1"/>
+          </a:fillRef>
+          <a:effectRef idx="1">
+            <a:schemeClr val="accent1"/>
+          </a:effectRef>
+          <a:fontRef idx="minor">
+            <a:schemeClr val="tx1"/>
+          </a:fontRef>
+        </p:style>
+      </p:cxnSp>
+      <p:cxnSp>
+        <p:nvCxnSpPr>
+          <p:cNvPr id="43" name="Elbow Connector 42"/>
+          <p:cNvCxnSpPr>
+            <a:stCxn id="5" idx="2"/>
+          </p:cNvCxnSpPr>
+          <p:nvPr/>
+        </p:nvCxnSpPr>
+        <p:spPr>
+          <a:xfrm rot="16200000" flipH="1">
+            <a:off x="1033859" y="2564113"/>
+            <a:ext cx="2529275" cy="1028631"/>
+          </a:xfrm>
+          <a:prstGeom prst="bentConnector3">
+            <a:avLst>
+              <a:gd name="adj1" fmla="val 101624"/>
+            </a:avLst>
+          </a:prstGeom>
+          <a:ln w="76200" cmpd="sng">
+            <a:solidFill>
+              <a:srgbClr val="A6A6A6"/>
+            </a:solidFill>
+            <a:tailEnd type="arrow"/>
+          </a:ln>
+        </p:spPr>
+        <p:style>
+          <a:lnRef idx="2">
+            <a:schemeClr val="accent1"/>
+          </a:lnRef>
+          <a:fillRef idx="0">
+            <a:schemeClr val="accent1"/>
+          </a:fillRef>
+          <a:effectRef idx="1">
+            <a:schemeClr val="accent1"/>
+          </a:effectRef>
+          <a:fontRef idx="minor">
+            <a:schemeClr val="tx1"/>
+          </a:fontRef>
+        </p:style>
+      </p:cxnSp>
+    </p:spTree>
+    <p:extLst>
+      <p:ext uri="{BB962C8B-B14F-4D97-AF65-F5344CB8AC3E}">
+        <p14:creationId xmlns:p14="http://schemas.microsoft.com/office/powerpoint/2010/main" val="2002956737"/>
+      </p:ext>
+    </p:extLst>
+  </p:cSld>
+  <p:clrMapOvr>
+    <a:masterClrMapping/>
+  </p:clrMapOvr>
+</p:sld>
+</file>
+
+<file path=ppt/slides/slide2.xml><?xml version="1.0" encoding="utf-8"?>
+<p:sld xmlns:a="http://schemas.openxmlformats.org/drawingml/2006/main" xmlns:r="http://schemas.openxmlformats.org/officeDocument/2006/relationships" xmlns:p="http://schemas.openxmlformats.org/presentationml/2006/main">
+  <p:cSld>
+    <p:spTree>
+      <p:nvGrpSpPr>
+        <p:cNvPr id="1" name=""/>
+        <p:cNvGrpSpPr/>
+        <p:nvPr/>
+      </p:nvGrpSpPr>
+      <p:grpSpPr>
+        <a:xfrm>
+          <a:off x="0" y="0"/>
+          <a:ext cx="0" cy="0"/>
+          <a:chOff x="0" y="0"/>
+          <a:chExt cx="0" cy="0"/>
+        </a:xfrm>
+      </p:grpSpPr>
+      <p:sp>
+        <p:nvSpPr>
+          <p:cNvPr id="2" name="Rounded Rectangle 1"/>
+          <p:cNvSpPr/>
+          <p:nvPr/>
+        </p:nvSpPr>
+        <p:spPr>
+          <a:xfrm>
+            <a:off x="131378" y="581627"/>
+            <a:ext cx="2451155" cy="1118024"/>
+          </a:xfrm>
+          <a:prstGeom prst="roundRect">
+            <a:avLst/>
+          </a:prstGeom>
+          <a:solidFill>
+            <a:schemeClr val="bg1">
+              <a:lumMod val="85000"/>
+            </a:schemeClr>
+          </a:solidFill>
+          <a:ln>
+            <a:solidFill>
+              <a:schemeClr val="bg1">
+                <a:lumMod val="85000"/>
+              </a:schemeClr>
+            </a:solidFill>
+          </a:ln>
+        </p:spPr>
+        <p:style>
+          <a:lnRef idx="1">
+            <a:schemeClr val="accent1"/>
+          </a:lnRef>
+          <a:fillRef idx="3">
+            <a:schemeClr val="accent1"/>
+          </a:fillRef>
+          <a:effectRef idx="2">
+            <a:schemeClr val="accent1"/>
+          </a:effectRef>
+          <a:fontRef idx="minor">
+            <a:schemeClr val="lt1"/>
+          </a:fontRef>
+        </p:style>
+        <p:txBody>
+          <a:bodyPr rtlCol="0" anchor="ctr"/>
+          <a:lstStyle/>
+          <a:p>
+            <a:pPr algn="ctr"/>
+            <a:r>
+              <a:rPr lang="en-US" sz="2500" dirty="0" smtClean="0">
+                <a:solidFill>
+                  <a:schemeClr val="tx1"/>
+                </a:solidFill>
+                <a:latin typeface="Segoe Light"/>
+                <a:cs typeface="Segoe Light"/>
+              </a:rPr>
+              <a:t>IDLE</a:t>
+            </a:r>
+            <a:endParaRPr lang="en-US" sz="2500" dirty="0">
+              <a:solidFill>
+                <a:schemeClr val="tx1"/>
+              </a:solidFill>
+              <a:latin typeface="Segoe Light"/>
+              <a:cs typeface="Segoe Light"/>
+            </a:endParaRPr>
+          </a:p>
+        </p:txBody>
+      </p:sp>
+      <p:sp>
+        <p:nvSpPr>
+          <p:cNvPr id="3" name="Rounded Rectangle 2"/>
+          <p:cNvSpPr/>
+          <p:nvPr/>
+        </p:nvSpPr>
+        <p:spPr>
+          <a:xfrm>
+            <a:off x="6291469" y="581626"/>
+            <a:ext cx="2727177" cy="1216417"/>
+          </a:xfrm>
+          <a:prstGeom prst="roundRect">
+            <a:avLst>
+              <a:gd name="adj" fmla="val 7821"/>
+            </a:avLst>
+          </a:prstGeom>
+          <a:solidFill>
+            <a:schemeClr val="bg1">
+              <a:lumMod val="85000"/>
+            </a:schemeClr>
+          </a:solidFill>
+          <a:ln>
+            <a:solidFill>
+              <a:schemeClr val="bg1">
+                <a:lumMod val="85000"/>
+              </a:schemeClr>
+            </a:solidFill>
+          </a:ln>
+        </p:spPr>
+        <p:style>
+          <a:lnRef idx="1">
+            <a:schemeClr val="accent1"/>
+          </a:lnRef>
+          <a:fillRef idx="3">
+            <a:schemeClr val="accent1"/>
+          </a:fillRef>
+          <a:effectRef idx="2">
+            <a:schemeClr val="accent1"/>
+          </a:effectRef>
+          <a:fontRef idx="minor">
+            <a:schemeClr val="lt1"/>
+          </a:fontRef>
+        </p:style>
+        <p:txBody>
+          <a:bodyPr rtlCol="0" anchor="ctr"/>
+          <a:lstStyle/>
+          <a:p>
+            <a:pPr algn="ctr"/>
+            <a:r>
+              <a:rPr lang="en-US" sz="2500" dirty="0" smtClean="0">
+                <a:solidFill>
+                  <a:schemeClr val="tx1"/>
+                </a:solidFill>
+                <a:latin typeface="Segoe Light"/>
+                <a:cs typeface="Segoe Light"/>
+              </a:rPr>
+              <a:t>CONNECTED</a:t>
+            </a:r>
+            <a:endParaRPr lang="en-US" sz="2500" dirty="0">
+              <a:solidFill>
+                <a:schemeClr val="tx1"/>
+              </a:solidFill>
+              <a:latin typeface="Segoe Light"/>
+              <a:cs typeface="Segoe Light"/>
+            </a:endParaRPr>
+          </a:p>
+        </p:txBody>
+      </p:sp>
+      <p:cxnSp>
+        <p:nvCxnSpPr>
+          <p:cNvPr id="7" name="Straight Arrow Connector 6"/>
+          <p:cNvCxnSpPr/>
+          <p:nvPr/>
+        </p:nvCxnSpPr>
+        <p:spPr>
+          <a:xfrm>
+            <a:off x="1494967" y="1699651"/>
+            <a:ext cx="0" cy="2332068"/>
           </a:xfrm>
           <a:prstGeom prst="straightConnector1">
             <a:avLst/>
@@ -4020,14 +4289,14 @@
       </p:cxnSp>
       <p:sp>
         <p:nvSpPr>
-          <p:cNvPr id="46" name="TextBox 45"/>
+          <p:cNvPr id="8" name="TextBox 7"/>
           <p:cNvSpPr txBox="1"/>
           <p:nvPr/>
         </p:nvSpPr>
         <p:spPr>
-          <a:xfrm>
-            <a:off x="5025846" y="2243093"/>
-            <a:ext cx="2450323" cy="769441"/>
+          <a:xfrm rot="5400000">
+            <a:off x="905904" y="2366120"/>
+            <a:ext cx="2102378" cy="769441"/>
           </a:xfrm>
           <a:prstGeom prst="rect">
             <a:avLst/>
@@ -4048,25 +4317,11 @@
               <a:t>e: </a:t>
             </a:r>
             <a:r>
-              <a:rPr lang="en-US" sz="2200" dirty="0" err="1" smtClean="0">
-                <a:latin typeface="Segoe Light"/>
-                <a:cs typeface="Segoe Light"/>
-              </a:rPr>
-              <a:t>XBee</a:t>
-            </a:r>
-            <a:r>
-              <a:rPr lang="en-US" sz="2200" dirty="0" smtClean="0">
-                <a:latin typeface="Segoe Light"/>
-                <a:cs typeface="Segoe Light"/>
-              </a:rPr>
-              <a:t> </a:t>
-            </a:r>
-            <a:r>
               <a:rPr lang="en-US" altLang="zh-CN" sz="2200" dirty="0" smtClean="0">
                 <a:latin typeface="Segoe Light"/>
                 <a:cs typeface="Segoe Light"/>
               </a:rPr>
-              <a:t>Connect</a:t>
+              <a:t>User Tap</a:t>
             </a:r>
             <a:endParaRPr lang="en-US" sz="2200" dirty="0" smtClean="0">
               <a:latin typeface="Segoe Light"/>
@@ -4079,7 +4334,14 @@
                 <a:latin typeface="Segoe Light"/>
                 <a:cs typeface="Segoe Light"/>
               </a:rPr>
-              <a:t>a: Status LED on</a:t>
+              <a:t>a: </a:t>
+            </a:r>
+            <a:r>
+              <a:rPr lang="en-US" sz="2200" dirty="0" smtClean="0">
+                <a:latin typeface="Segoe Light"/>
+                <a:cs typeface="Segoe Light"/>
+              </a:rPr>
+              <a:t>IR Broadcast</a:t>
             </a:r>
             <a:endParaRPr lang="en-US" sz="2200" dirty="0">
               <a:latin typeface="Segoe Light"/>
@@ -4088,10 +4350,893 @@
           </a:p>
         </p:txBody>
       </p:sp>
+      <p:cxnSp>
+        <p:nvCxnSpPr>
+          <p:cNvPr id="10" name="Straight Arrow Connector 9"/>
+          <p:cNvCxnSpPr>
+            <a:stCxn id="3" idx="1"/>
+            <a:endCxn id="2" idx="3"/>
+          </p:cNvCxnSpPr>
+          <p:nvPr/>
+        </p:nvCxnSpPr>
+        <p:spPr>
+          <a:xfrm flipH="1" flipV="1">
+            <a:off x="2582533" y="1140639"/>
+            <a:ext cx="3708936" cy="49196"/>
+          </a:xfrm>
+          <a:prstGeom prst="straightConnector1">
+            <a:avLst/>
+          </a:prstGeom>
+          <a:ln w="76200" cmpd="sng">
+            <a:solidFill>
+              <a:schemeClr val="bg1">
+                <a:lumMod val="65000"/>
+              </a:schemeClr>
+            </a:solidFill>
+            <a:tailEnd type="arrow"/>
+          </a:ln>
+        </p:spPr>
+        <p:style>
+          <a:lnRef idx="2">
+            <a:schemeClr val="accent1"/>
+          </a:lnRef>
+          <a:fillRef idx="0">
+            <a:schemeClr val="accent1"/>
+          </a:fillRef>
+          <a:effectRef idx="1">
+            <a:schemeClr val="accent1"/>
+          </a:effectRef>
+          <a:fontRef idx="minor">
+            <a:schemeClr val="tx1"/>
+          </a:fontRef>
+        </p:style>
+      </p:cxnSp>
+      <p:sp>
+        <p:nvSpPr>
+          <p:cNvPr id="11" name="TextBox 10"/>
+          <p:cNvSpPr txBox="1"/>
+          <p:nvPr/>
+        </p:nvSpPr>
+        <p:spPr>
+          <a:xfrm>
+            <a:off x="3287762" y="420634"/>
+            <a:ext cx="2505186" cy="1107996"/>
+          </a:xfrm>
+          <a:prstGeom prst="rect">
+            <a:avLst/>
+          </a:prstGeom>
+          <a:noFill/>
+        </p:spPr>
+        <p:txBody>
+          <a:bodyPr wrap="square" rtlCol="0">
+            <a:spAutoFit/>
+          </a:bodyPr>
+          <a:lstStyle/>
+          <a:p>
+            <a:r>
+              <a:rPr lang="en-US" sz="2200" dirty="0" smtClean="0">
+                <a:latin typeface="Segoe Light"/>
+                <a:cs typeface="Segoe Light"/>
+              </a:rPr>
+              <a:t>e</a:t>
+            </a:r>
+            <a:r>
+              <a:rPr lang="en-US" sz="2200" dirty="0" smtClean="0">
+                <a:latin typeface="Segoe Light"/>
+                <a:cs typeface="Segoe Light"/>
+              </a:rPr>
+              <a:t>: User Disconnect</a:t>
+            </a:r>
+            <a:endParaRPr lang="en-US" sz="2200" dirty="0" smtClean="0">
+              <a:latin typeface="Segoe Light"/>
+              <a:cs typeface="Segoe Light"/>
+            </a:endParaRPr>
+          </a:p>
+          <a:p>
+            <a:r>
+              <a:rPr lang="en-US" sz="2200" dirty="0" smtClean="0">
+                <a:latin typeface="Segoe Light"/>
+                <a:cs typeface="Segoe Light"/>
+              </a:rPr>
+              <a:t>a: </a:t>
+            </a:r>
+            <a:r>
+              <a:rPr lang="en-US" sz="2200" dirty="0" err="1">
+                <a:latin typeface="Segoe Light"/>
+                <a:cs typeface="Segoe Light"/>
+              </a:rPr>
+              <a:t>XBee</a:t>
+            </a:r>
+            <a:r>
+              <a:rPr lang="en-US" sz="2200" dirty="0">
+                <a:latin typeface="Segoe Light"/>
+                <a:cs typeface="Segoe Light"/>
+              </a:rPr>
+              <a:t> </a:t>
+            </a:r>
+            <a:r>
+              <a:rPr lang="en-US" sz="2200" dirty="0" smtClean="0">
+                <a:latin typeface="Segoe Light"/>
+                <a:cs typeface="Segoe Light"/>
+              </a:rPr>
+              <a:t>Disconnect</a:t>
+            </a:r>
+            <a:endParaRPr lang="en-US" sz="2200" dirty="0" smtClean="0">
+              <a:latin typeface="Segoe Light"/>
+              <a:cs typeface="Segoe Light"/>
+            </a:endParaRPr>
+          </a:p>
+          <a:p>
+            <a:endParaRPr lang="en-US" sz="2200" dirty="0" smtClean="0">
+              <a:latin typeface="Segoe Light"/>
+              <a:cs typeface="Segoe Light"/>
+            </a:endParaRPr>
+          </a:p>
+        </p:txBody>
+      </p:sp>
+      <p:cxnSp>
+        <p:nvCxnSpPr>
+          <p:cNvPr id="12" name="Straight Arrow Connector 11"/>
+          <p:cNvCxnSpPr/>
+          <p:nvPr/>
+        </p:nvCxnSpPr>
+        <p:spPr>
+          <a:xfrm flipV="1">
+            <a:off x="926913" y="1699651"/>
+            <a:ext cx="0" cy="2332068"/>
+          </a:xfrm>
+          <a:prstGeom prst="straightConnector1">
+            <a:avLst/>
+          </a:prstGeom>
+          <a:ln w="76200" cmpd="sng">
+            <a:solidFill>
+              <a:schemeClr val="bg1">
+                <a:lumMod val="65000"/>
+              </a:schemeClr>
+            </a:solidFill>
+            <a:tailEnd type="arrow"/>
+          </a:ln>
+        </p:spPr>
+        <p:style>
+          <a:lnRef idx="2">
+            <a:schemeClr val="accent1"/>
+          </a:lnRef>
+          <a:fillRef idx="0">
+            <a:schemeClr val="accent1"/>
+          </a:fillRef>
+          <a:effectRef idx="1">
+            <a:schemeClr val="accent1"/>
+          </a:effectRef>
+          <a:fontRef idx="minor">
+            <a:schemeClr val="tx1"/>
+          </a:fontRef>
+        </p:style>
+      </p:cxnSp>
+      <p:sp>
+        <p:nvSpPr>
+          <p:cNvPr id="18" name="TextBox 17"/>
+          <p:cNvSpPr txBox="1"/>
+          <p:nvPr/>
+        </p:nvSpPr>
+        <p:spPr>
+          <a:xfrm>
+            <a:off x="6865384" y="4892297"/>
+            <a:ext cx="1906209" cy="769441"/>
+          </a:xfrm>
+          <a:prstGeom prst="rect">
+            <a:avLst/>
+          </a:prstGeom>
+          <a:noFill/>
+        </p:spPr>
+        <p:txBody>
+          <a:bodyPr wrap="square" rtlCol="0">
+            <a:spAutoFit/>
+          </a:bodyPr>
+          <a:lstStyle/>
+          <a:p>
+            <a:r>
+              <a:rPr lang="en-US" sz="2200" dirty="0" smtClean="0">
+                <a:latin typeface="Segoe Light"/>
+                <a:cs typeface="Segoe Light"/>
+              </a:rPr>
+              <a:t>e</a:t>
+            </a:r>
+            <a:r>
+              <a:rPr lang="en-US" sz="2200" dirty="0" smtClean="0">
+                <a:latin typeface="Segoe Light"/>
+                <a:cs typeface="Segoe Light"/>
+              </a:rPr>
+              <a:t>: User slide</a:t>
+            </a:r>
+            <a:endParaRPr lang="en-US" sz="2200" dirty="0" smtClean="0">
+              <a:latin typeface="Segoe Light"/>
+              <a:cs typeface="Segoe Light"/>
+            </a:endParaRPr>
+          </a:p>
+          <a:p>
+            <a:r>
+              <a:rPr lang="en-US" sz="2200" dirty="0" smtClean="0">
+                <a:latin typeface="Segoe Light"/>
+                <a:cs typeface="Segoe Light"/>
+              </a:rPr>
+              <a:t>a: </a:t>
+            </a:r>
+            <a:r>
+              <a:rPr lang="en-US" sz="2200" dirty="0" err="1">
+                <a:latin typeface="Segoe Light"/>
+                <a:cs typeface="Segoe Light"/>
+              </a:rPr>
+              <a:t>XBee</a:t>
+            </a:r>
+            <a:r>
+              <a:rPr lang="en-US" sz="2200" dirty="0">
+                <a:latin typeface="Segoe Light"/>
+                <a:cs typeface="Segoe Light"/>
+              </a:rPr>
+              <a:t> </a:t>
+            </a:r>
+            <a:r>
+              <a:rPr lang="en-US" altLang="zh-CN" sz="2200" dirty="0" smtClean="0">
+                <a:latin typeface="Segoe Light"/>
+                <a:cs typeface="Segoe Light"/>
+              </a:rPr>
+              <a:t>Verify</a:t>
+            </a:r>
+            <a:endParaRPr lang="en-US" sz="2200" dirty="0">
+              <a:latin typeface="Segoe Light"/>
+              <a:cs typeface="Segoe Light"/>
+            </a:endParaRPr>
+          </a:p>
+        </p:txBody>
+      </p:sp>
+      <p:sp>
+        <p:nvSpPr>
+          <p:cNvPr id="23" name="Rounded Rectangle 22"/>
+          <p:cNvSpPr/>
+          <p:nvPr/>
+        </p:nvSpPr>
+        <p:spPr>
+          <a:xfrm>
+            <a:off x="134240" y="4031719"/>
+            <a:ext cx="2448293" cy="1047945"/>
+          </a:xfrm>
+          <a:prstGeom prst="roundRect">
+            <a:avLst>
+              <a:gd name="adj" fmla="val 7821"/>
+            </a:avLst>
+          </a:prstGeom>
+          <a:solidFill>
+            <a:schemeClr val="bg1">
+              <a:lumMod val="85000"/>
+            </a:schemeClr>
+          </a:solidFill>
+          <a:ln>
+            <a:solidFill>
+              <a:schemeClr val="bg1">
+                <a:lumMod val="85000"/>
+              </a:schemeClr>
+            </a:solidFill>
+          </a:ln>
+        </p:spPr>
+        <p:style>
+          <a:lnRef idx="1">
+            <a:schemeClr val="accent1"/>
+          </a:lnRef>
+          <a:fillRef idx="3">
+            <a:schemeClr val="accent1"/>
+          </a:fillRef>
+          <a:effectRef idx="2">
+            <a:schemeClr val="accent1"/>
+          </a:effectRef>
+          <a:fontRef idx="minor">
+            <a:schemeClr val="lt1"/>
+          </a:fontRef>
+        </p:style>
+        <p:txBody>
+          <a:bodyPr rtlCol="0" anchor="ctr"/>
+          <a:lstStyle/>
+          <a:p>
+            <a:pPr algn="ctr"/>
+            <a:r>
+              <a:rPr lang="en-US" sz="2500" dirty="0" smtClean="0">
+                <a:solidFill>
+                  <a:schemeClr val="tx1"/>
+                </a:solidFill>
+                <a:latin typeface="Segoe Light"/>
+                <a:cs typeface="Segoe Light"/>
+              </a:rPr>
+              <a:t>WAIT</a:t>
+            </a:r>
+            <a:endParaRPr lang="en-US" sz="2500" dirty="0">
+              <a:solidFill>
+                <a:schemeClr val="tx1"/>
+              </a:solidFill>
+              <a:latin typeface="Segoe Light"/>
+              <a:cs typeface="Segoe Light"/>
+            </a:endParaRPr>
+          </a:p>
+        </p:txBody>
+      </p:sp>
+      <p:sp>
+        <p:nvSpPr>
+          <p:cNvPr id="29" name="Rounded Rectangle 28"/>
+          <p:cNvSpPr/>
+          <p:nvPr/>
+        </p:nvSpPr>
+        <p:spPr>
+          <a:xfrm>
+            <a:off x="4401529" y="2996787"/>
+            <a:ext cx="2451155" cy="1118024"/>
+          </a:xfrm>
+          <a:prstGeom prst="roundRect">
+            <a:avLst/>
+          </a:prstGeom>
+          <a:solidFill>
+            <a:schemeClr val="bg1">
+              <a:lumMod val="85000"/>
+            </a:schemeClr>
+          </a:solidFill>
+          <a:ln>
+            <a:solidFill>
+              <a:schemeClr val="bg1">
+                <a:lumMod val="85000"/>
+              </a:schemeClr>
+            </a:solidFill>
+          </a:ln>
+        </p:spPr>
+        <p:style>
+          <a:lnRef idx="1">
+            <a:schemeClr val="accent1"/>
+          </a:lnRef>
+          <a:fillRef idx="3">
+            <a:schemeClr val="accent1"/>
+          </a:fillRef>
+          <a:effectRef idx="2">
+            <a:schemeClr val="accent1"/>
+          </a:effectRef>
+          <a:fontRef idx="minor">
+            <a:schemeClr val="lt1"/>
+          </a:fontRef>
+        </p:style>
+        <p:txBody>
+          <a:bodyPr rtlCol="0" anchor="ctr"/>
+          <a:lstStyle/>
+          <a:p>
+            <a:pPr algn="ctr"/>
+            <a:r>
+              <a:rPr lang="en-US" sz="2500" dirty="0" smtClean="0">
+                <a:solidFill>
+                  <a:schemeClr val="tx1"/>
+                </a:solidFill>
+                <a:latin typeface="Segoe Light"/>
+                <a:cs typeface="Segoe Light"/>
+              </a:rPr>
+              <a:t>CONFIRM</a:t>
+            </a:r>
+            <a:endParaRPr lang="en-US" sz="2500" dirty="0">
+              <a:solidFill>
+                <a:schemeClr val="tx1"/>
+              </a:solidFill>
+              <a:latin typeface="Segoe Light"/>
+              <a:cs typeface="Segoe Light"/>
+            </a:endParaRPr>
+          </a:p>
+        </p:txBody>
+      </p:sp>
+      <p:sp>
+        <p:nvSpPr>
+          <p:cNvPr id="34" name="Rounded Rectangle 33"/>
+          <p:cNvSpPr/>
+          <p:nvPr/>
+        </p:nvSpPr>
+        <p:spPr>
+          <a:xfrm>
+            <a:off x="4401529" y="5114504"/>
+            <a:ext cx="2451155" cy="1118024"/>
+          </a:xfrm>
+          <a:prstGeom prst="roundRect">
+            <a:avLst/>
+          </a:prstGeom>
+          <a:solidFill>
+            <a:schemeClr val="bg1">
+              <a:lumMod val="85000"/>
+            </a:schemeClr>
+          </a:solidFill>
+          <a:ln>
+            <a:solidFill>
+              <a:schemeClr val="bg1">
+                <a:lumMod val="85000"/>
+              </a:schemeClr>
+            </a:solidFill>
+          </a:ln>
+        </p:spPr>
+        <p:style>
+          <a:lnRef idx="1">
+            <a:schemeClr val="accent1"/>
+          </a:lnRef>
+          <a:fillRef idx="3">
+            <a:schemeClr val="accent1"/>
+          </a:fillRef>
+          <a:effectRef idx="2">
+            <a:schemeClr val="accent1"/>
+          </a:effectRef>
+          <a:fontRef idx="minor">
+            <a:schemeClr val="lt1"/>
+          </a:fontRef>
+        </p:style>
+        <p:txBody>
+          <a:bodyPr rtlCol="0" anchor="ctr"/>
+          <a:lstStyle/>
+          <a:p>
+            <a:pPr algn="ctr"/>
+            <a:r>
+              <a:rPr lang="en-US" sz="2500" dirty="0" smtClean="0">
+                <a:solidFill>
+                  <a:schemeClr val="tx1"/>
+                </a:solidFill>
+                <a:latin typeface="Segoe Light"/>
+                <a:cs typeface="Segoe Light"/>
+              </a:rPr>
+              <a:t>VERIFY</a:t>
+            </a:r>
+            <a:endParaRPr lang="en-US" sz="2500" dirty="0">
+              <a:solidFill>
+                <a:schemeClr val="tx1"/>
+              </a:solidFill>
+              <a:latin typeface="Segoe Light"/>
+              <a:cs typeface="Segoe Light"/>
+            </a:endParaRPr>
+          </a:p>
+        </p:txBody>
+      </p:sp>
+      <p:sp>
+        <p:nvSpPr>
+          <p:cNvPr id="47" name="TextBox 46"/>
+          <p:cNvSpPr txBox="1"/>
+          <p:nvPr/>
+        </p:nvSpPr>
+        <p:spPr>
+          <a:xfrm>
+            <a:off x="2329830" y="2776232"/>
+            <a:ext cx="2102378" cy="769441"/>
+          </a:xfrm>
+          <a:prstGeom prst="rect">
+            <a:avLst/>
+          </a:prstGeom>
+          <a:noFill/>
+        </p:spPr>
+        <p:txBody>
+          <a:bodyPr wrap="square" rtlCol="0">
+            <a:spAutoFit/>
+          </a:bodyPr>
+          <a:lstStyle/>
+          <a:p>
+            <a:r>
+              <a:rPr lang="en-US" sz="2200" dirty="0" smtClean="0">
+                <a:latin typeface="Segoe Light"/>
+                <a:cs typeface="Segoe Light"/>
+              </a:rPr>
+              <a:t>e: </a:t>
+            </a:r>
+            <a:r>
+              <a:rPr lang="en-US" altLang="zh-CN" sz="2200" dirty="0" smtClean="0">
+                <a:latin typeface="Segoe Light"/>
+                <a:cs typeface="Segoe Light"/>
+              </a:rPr>
+              <a:t>Timer Expire &amp; </a:t>
+            </a:r>
+            <a:r>
+              <a:rPr lang="en-US" altLang="zh-CN" sz="2200" dirty="0" err="1" smtClean="0">
+                <a:latin typeface="Segoe Light"/>
+                <a:cs typeface="Segoe Light"/>
+              </a:rPr>
+              <a:t>Ack</a:t>
+            </a:r>
+            <a:r>
+              <a:rPr lang="en-US" altLang="zh-CN" sz="2200" dirty="0" smtClean="0">
+                <a:latin typeface="Segoe Light"/>
+                <a:cs typeface="Segoe Light"/>
+              </a:rPr>
+              <a:t> # == 1</a:t>
+            </a:r>
+            <a:endParaRPr lang="en-US" sz="2200" dirty="0">
+              <a:latin typeface="Segoe Light"/>
+              <a:cs typeface="Segoe Light"/>
+            </a:endParaRPr>
+          </a:p>
+        </p:txBody>
+      </p:sp>
+      <p:sp>
+        <p:nvSpPr>
+          <p:cNvPr id="53" name="TextBox 52"/>
+          <p:cNvSpPr txBox="1"/>
+          <p:nvPr/>
+        </p:nvSpPr>
+        <p:spPr>
+          <a:xfrm>
+            <a:off x="2246740" y="5661738"/>
+            <a:ext cx="2102378" cy="769441"/>
+          </a:xfrm>
+          <a:prstGeom prst="rect">
+            <a:avLst/>
+          </a:prstGeom>
+          <a:noFill/>
+        </p:spPr>
+        <p:txBody>
+          <a:bodyPr wrap="square" rtlCol="0">
+            <a:spAutoFit/>
+          </a:bodyPr>
+          <a:lstStyle/>
+          <a:p>
+            <a:r>
+              <a:rPr lang="en-US" sz="2200" dirty="0" smtClean="0">
+                <a:latin typeface="Segoe Light"/>
+                <a:cs typeface="Segoe Light"/>
+              </a:rPr>
+              <a:t>e: </a:t>
+            </a:r>
+            <a:r>
+              <a:rPr lang="en-US" altLang="zh-CN" sz="2200" dirty="0" smtClean="0">
+                <a:latin typeface="Segoe Light"/>
+                <a:cs typeface="Segoe Light"/>
+              </a:rPr>
+              <a:t>Timer Expire &amp; </a:t>
+            </a:r>
+            <a:r>
+              <a:rPr lang="en-US" altLang="zh-CN" sz="2200" dirty="0" err="1" smtClean="0">
+                <a:latin typeface="Segoe Light"/>
+                <a:cs typeface="Segoe Light"/>
+              </a:rPr>
+              <a:t>Ack</a:t>
+            </a:r>
+            <a:r>
+              <a:rPr lang="en-US" altLang="zh-CN" sz="2200" dirty="0" smtClean="0">
+                <a:latin typeface="Segoe Light"/>
+                <a:cs typeface="Segoe Light"/>
+              </a:rPr>
+              <a:t> # &gt; 1</a:t>
+            </a:r>
+            <a:endParaRPr lang="en-US" sz="2200" dirty="0">
+              <a:latin typeface="Segoe Light"/>
+              <a:cs typeface="Segoe Light"/>
+            </a:endParaRPr>
+          </a:p>
+        </p:txBody>
+      </p:sp>
+      <p:sp>
+        <p:nvSpPr>
+          <p:cNvPr id="55" name="TextBox 54"/>
+          <p:cNvSpPr txBox="1"/>
+          <p:nvPr/>
+        </p:nvSpPr>
+        <p:spPr>
+          <a:xfrm rot="16200000">
+            <a:off x="-667200" y="2504610"/>
+            <a:ext cx="2102378" cy="769441"/>
+          </a:xfrm>
+          <a:prstGeom prst="rect">
+            <a:avLst/>
+          </a:prstGeom>
+          <a:noFill/>
+        </p:spPr>
+        <p:txBody>
+          <a:bodyPr wrap="square" rtlCol="0">
+            <a:spAutoFit/>
+          </a:bodyPr>
+          <a:lstStyle/>
+          <a:p>
+            <a:r>
+              <a:rPr lang="en-US" sz="2200" dirty="0" smtClean="0">
+                <a:latin typeface="Segoe Light"/>
+                <a:cs typeface="Segoe Light"/>
+              </a:rPr>
+              <a:t>e: </a:t>
+            </a:r>
+            <a:r>
+              <a:rPr lang="en-US" altLang="zh-CN" sz="2200" dirty="0" smtClean="0">
+                <a:latin typeface="Segoe Light"/>
+                <a:cs typeface="Segoe Light"/>
+              </a:rPr>
+              <a:t>Timer Expire &amp; </a:t>
+            </a:r>
+            <a:r>
+              <a:rPr lang="en-US" altLang="zh-CN" sz="2200" dirty="0" err="1" smtClean="0">
+                <a:latin typeface="Segoe Light"/>
+                <a:cs typeface="Segoe Light"/>
+              </a:rPr>
+              <a:t>Ack</a:t>
+            </a:r>
+            <a:r>
+              <a:rPr lang="en-US" altLang="zh-CN" sz="2200" dirty="0" smtClean="0">
+                <a:latin typeface="Segoe Light"/>
+                <a:cs typeface="Segoe Light"/>
+              </a:rPr>
+              <a:t> # == 0</a:t>
+            </a:r>
+            <a:endParaRPr lang="en-US" sz="2200" dirty="0">
+              <a:latin typeface="Segoe Light"/>
+              <a:cs typeface="Segoe Light"/>
+            </a:endParaRPr>
+          </a:p>
+        </p:txBody>
+      </p:sp>
+      <p:cxnSp>
+        <p:nvCxnSpPr>
+          <p:cNvPr id="60" name="Elbow Connector 59"/>
+          <p:cNvCxnSpPr>
+            <a:endCxn id="29" idx="1"/>
+          </p:cNvCxnSpPr>
+          <p:nvPr/>
+        </p:nvCxnSpPr>
+        <p:spPr>
+          <a:xfrm flipV="1">
+            <a:off x="2243344" y="3555799"/>
+            <a:ext cx="2158185" cy="384721"/>
+          </a:xfrm>
+          <a:prstGeom prst="bentConnector3">
+            <a:avLst>
+              <a:gd name="adj1" fmla="val -48"/>
+            </a:avLst>
+          </a:prstGeom>
+          <a:ln w="76200" cmpd="sng">
+            <a:solidFill>
+              <a:schemeClr val="bg1">
+                <a:lumMod val="65000"/>
+              </a:schemeClr>
+            </a:solidFill>
+            <a:tailEnd type="arrow"/>
+          </a:ln>
+        </p:spPr>
+        <p:style>
+          <a:lnRef idx="2">
+            <a:schemeClr val="accent1"/>
+          </a:lnRef>
+          <a:fillRef idx="0">
+            <a:schemeClr val="accent1"/>
+          </a:fillRef>
+          <a:effectRef idx="1">
+            <a:schemeClr val="accent1"/>
+          </a:effectRef>
+          <a:fontRef idx="minor">
+            <a:schemeClr val="tx1"/>
+          </a:fontRef>
+        </p:style>
+      </p:cxnSp>
+      <p:cxnSp>
+        <p:nvCxnSpPr>
+          <p:cNvPr id="67" name="Elbow Connector 66"/>
+          <p:cNvCxnSpPr>
+            <a:endCxn id="34" idx="1"/>
+          </p:cNvCxnSpPr>
+          <p:nvPr/>
+        </p:nvCxnSpPr>
+        <p:spPr>
+          <a:xfrm>
+            <a:off x="2243344" y="5199136"/>
+            <a:ext cx="2158185" cy="474380"/>
+          </a:xfrm>
+          <a:prstGeom prst="bentConnector3">
+            <a:avLst>
+              <a:gd name="adj1" fmla="val -48"/>
+            </a:avLst>
+          </a:prstGeom>
+          <a:ln w="76200" cmpd="sng">
+            <a:solidFill>
+              <a:schemeClr val="bg1">
+                <a:lumMod val="65000"/>
+              </a:schemeClr>
+            </a:solidFill>
+            <a:tailEnd type="arrow"/>
+          </a:ln>
+        </p:spPr>
+        <p:style>
+          <a:lnRef idx="2">
+            <a:schemeClr val="accent1"/>
+          </a:lnRef>
+          <a:fillRef idx="0">
+            <a:schemeClr val="accent1"/>
+          </a:fillRef>
+          <a:effectRef idx="1">
+            <a:schemeClr val="accent1"/>
+          </a:effectRef>
+          <a:fontRef idx="minor">
+            <a:schemeClr val="tx1"/>
+          </a:fontRef>
+        </p:style>
+      </p:cxnSp>
+      <p:sp>
+        <p:nvSpPr>
+          <p:cNvPr id="71" name="TextBox 70"/>
+          <p:cNvSpPr txBox="1"/>
+          <p:nvPr/>
+        </p:nvSpPr>
+        <p:spPr>
+          <a:xfrm rot="16200000">
+            <a:off x="6867570" y="2595809"/>
+            <a:ext cx="2102378" cy="769441"/>
+          </a:xfrm>
+          <a:prstGeom prst="rect">
+            <a:avLst/>
+          </a:prstGeom>
+          <a:noFill/>
+        </p:spPr>
+        <p:txBody>
+          <a:bodyPr wrap="square" rtlCol="0">
+            <a:spAutoFit/>
+          </a:bodyPr>
+          <a:lstStyle/>
+          <a:p>
+            <a:r>
+              <a:rPr lang="en-US" sz="2200" dirty="0" smtClean="0">
+                <a:latin typeface="Segoe Light"/>
+                <a:cs typeface="Segoe Light"/>
+              </a:rPr>
+              <a:t>e: </a:t>
+            </a:r>
+            <a:r>
+              <a:rPr lang="en-US" sz="2200" dirty="0" smtClean="0">
+                <a:latin typeface="Segoe Light"/>
+                <a:cs typeface="Segoe Light"/>
+              </a:rPr>
+              <a:t>User Confirm</a:t>
+            </a:r>
+            <a:endParaRPr lang="en-US" altLang="zh-CN" sz="2200" dirty="0" smtClean="0">
+              <a:latin typeface="Segoe Light"/>
+              <a:cs typeface="Segoe Light"/>
+            </a:endParaRPr>
+          </a:p>
+          <a:p>
+            <a:r>
+              <a:rPr lang="en-US" altLang="zh-CN" sz="2200" dirty="0" smtClean="0">
+                <a:latin typeface="Segoe Light"/>
+                <a:cs typeface="Segoe Light"/>
+              </a:rPr>
+              <a:t>a: </a:t>
+            </a:r>
+            <a:r>
+              <a:rPr lang="en-US" altLang="zh-CN" sz="2200" dirty="0" err="1" smtClean="0">
+                <a:latin typeface="Segoe Light"/>
+                <a:cs typeface="Segoe Light"/>
+              </a:rPr>
+              <a:t>XBee</a:t>
+            </a:r>
+            <a:r>
+              <a:rPr lang="en-US" altLang="zh-CN" sz="2200" dirty="0" smtClean="0">
+                <a:latin typeface="Segoe Light"/>
+                <a:cs typeface="Segoe Light"/>
+              </a:rPr>
+              <a:t> Connect</a:t>
+            </a:r>
+            <a:endParaRPr lang="en-US" sz="2200" dirty="0">
+              <a:latin typeface="Segoe Light"/>
+              <a:cs typeface="Segoe Light"/>
+            </a:endParaRPr>
+          </a:p>
+        </p:txBody>
+      </p:sp>
+      <p:cxnSp>
+        <p:nvCxnSpPr>
+          <p:cNvPr id="72" name="Elbow Connector 71"/>
+          <p:cNvCxnSpPr>
+            <a:stCxn id="29" idx="3"/>
+          </p:cNvCxnSpPr>
+          <p:nvPr/>
+        </p:nvCxnSpPr>
+        <p:spPr>
+          <a:xfrm flipV="1">
+            <a:off x="6852684" y="1798043"/>
+            <a:ext cx="547634" cy="1757756"/>
+          </a:xfrm>
+          <a:prstGeom prst="bentConnector2">
+            <a:avLst/>
+          </a:prstGeom>
+          <a:ln w="76200" cmpd="sng">
+            <a:solidFill>
+              <a:schemeClr val="bg1">
+                <a:lumMod val="65000"/>
+              </a:schemeClr>
+            </a:solidFill>
+            <a:tailEnd type="arrow"/>
+          </a:ln>
+        </p:spPr>
+        <p:style>
+          <a:lnRef idx="2">
+            <a:schemeClr val="accent1"/>
+          </a:lnRef>
+          <a:fillRef idx="0">
+            <a:schemeClr val="accent1"/>
+          </a:fillRef>
+          <a:effectRef idx="1">
+            <a:schemeClr val="accent1"/>
+          </a:effectRef>
+          <a:fontRef idx="minor">
+            <a:schemeClr val="tx1"/>
+          </a:fontRef>
+        </p:style>
+      </p:cxnSp>
+      <p:cxnSp>
+        <p:nvCxnSpPr>
+          <p:cNvPr id="113" name="Elbow Connector 112"/>
+          <p:cNvCxnSpPr>
+            <a:stCxn id="34" idx="3"/>
+          </p:cNvCxnSpPr>
+          <p:nvPr/>
+        </p:nvCxnSpPr>
+        <p:spPr>
+          <a:xfrm>
+            <a:off x="6852684" y="5673516"/>
+            <a:ext cx="12700" cy="415884"/>
+          </a:xfrm>
+          <a:prstGeom prst="bentConnector4">
+            <a:avLst>
+              <a:gd name="adj1" fmla="val 15209898"/>
+              <a:gd name="adj2" fmla="val 98891"/>
+            </a:avLst>
+          </a:prstGeom>
+          <a:ln w="76200" cmpd="sng">
+            <a:solidFill>
+              <a:srgbClr val="A6A6A6"/>
+            </a:solidFill>
+            <a:tailEnd type="arrow"/>
+          </a:ln>
+        </p:spPr>
+        <p:style>
+          <a:lnRef idx="2">
+            <a:schemeClr val="accent1"/>
+          </a:lnRef>
+          <a:fillRef idx="0">
+            <a:schemeClr val="accent1"/>
+          </a:fillRef>
+          <a:effectRef idx="1">
+            <a:schemeClr val="accent1"/>
+          </a:effectRef>
+          <a:fontRef idx="minor">
+            <a:schemeClr val="tx1"/>
+          </a:fontRef>
+        </p:style>
+      </p:cxnSp>
+      <p:cxnSp>
+        <p:nvCxnSpPr>
+          <p:cNvPr id="118" name="Elbow Connector 117"/>
+          <p:cNvCxnSpPr/>
+          <p:nvPr/>
+        </p:nvCxnSpPr>
+        <p:spPr>
+          <a:xfrm rot="5400000" flipH="1" flipV="1">
+            <a:off x="5608175" y="2247825"/>
+            <a:ext cx="3276365" cy="2409521"/>
+          </a:xfrm>
+          <a:prstGeom prst="bentConnector3">
+            <a:avLst>
+              <a:gd name="adj1" fmla="val 16669"/>
+            </a:avLst>
+          </a:prstGeom>
+          <a:ln w="76200" cmpd="sng">
+            <a:solidFill>
+              <a:srgbClr val="A6A6A6"/>
+            </a:solidFill>
+            <a:tailEnd type="arrow"/>
+          </a:ln>
+        </p:spPr>
+        <p:style>
+          <a:lnRef idx="2">
+            <a:schemeClr val="accent1"/>
+          </a:lnRef>
+          <a:fillRef idx="0">
+            <a:schemeClr val="accent1"/>
+          </a:fillRef>
+          <a:effectRef idx="1">
+            <a:schemeClr val="accent1"/>
+          </a:effectRef>
+          <a:fontRef idx="minor">
+            <a:schemeClr val="tx1"/>
+          </a:fontRef>
+        </p:style>
+      </p:cxnSp>
     </p:spTree>
     <p:extLst>
       <p:ext uri="{BB962C8B-B14F-4D97-AF65-F5344CB8AC3E}">
-        <p14:creationId xmlns:p14="http://schemas.microsoft.com/office/powerpoint/2010/main" val="2002956737"/>
+        <p14:creationId xmlns:p14="http://schemas.microsoft.com/office/powerpoint/2010/main" val="1429800871"/>
       </p:ext>
     </p:extLst>
   </p:cSld>

</xml_diff>

<commit_message>
update intro, refine the language and some description, good with me
</commit_message>
<xml_diff>
--- a/doc/figure.pptx
+++ b/doc/figure.pptx
@@ -3637,7 +3637,7 @@
         </p:nvSpPr>
         <p:spPr>
           <a:xfrm>
-            <a:off x="2871747" y="4067045"/>
+            <a:off x="3230251" y="4055852"/>
             <a:ext cx="552044" cy="552044"/>
           </a:xfrm>
           <a:prstGeom prst="ellipse">
@@ -3757,7 +3757,7 @@
         </p:nvSpPr>
         <p:spPr>
           <a:xfrm>
-            <a:off x="3246700" y="5546197"/>
+            <a:off x="3401010" y="5522457"/>
             <a:ext cx="2812319" cy="769441"/>
           </a:xfrm>
           <a:prstGeom prst="rect">
@@ -3978,8 +3978,8 @@
         </p:nvCxnSpPr>
         <p:spPr>
           <a:xfrm>
-            <a:off x="3423791" y="4343067"/>
-            <a:ext cx="3416598" cy="558359"/>
+            <a:off x="3782295" y="4331874"/>
+            <a:ext cx="3058094" cy="569552"/>
           </a:xfrm>
           <a:prstGeom prst="bentConnector2">
             <a:avLst/>
@@ -4017,8 +4017,8 @@
         </p:nvCxnSpPr>
         <p:spPr>
           <a:xfrm rot="10800000">
-            <a:off x="3147769" y="4619089"/>
-            <a:ext cx="2911250" cy="890546"/>
+            <a:off x="3506273" y="4607897"/>
+            <a:ext cx="2552746" cy="901739"/>
           </a:xfrm>
           <a:prstGeom prst="bentConnector2">
             <a:avLst/>
@@ -4334,14 +4334,7 @@
                 <a:latin typeface="Segoe Light"/>
                 <a:cs typeface="Segoe Light"/>
               </a:rPr>
-              <a:t>a: </a:t>
-            </a:r>
-            <a:r>
-              <a:rPr lang="en-US" sz="2200" dirty="0" smtClean="0">
-                <a:latin typeface="Segoe Light"/>
-                <a:cs typeface="Segoe Light"/>
-              </a:rPr>
-              <a:t>IR Broadcast</a:t>
+              <a:t>a: IR Broadcast</a:t>
             </a:r>
             <a:endParaRPr lang="en-US" sz="2200" dirty="0">
               <a:latin typeface="Segoe Light"/>
@@ -4418,53 +4411,38 @@
                 <a:latin typeface="Segoe Light"/>
                 <a:cs typeface="Segoe Light"/>
               </a:rPr>
-              <a:t>e</a:t>
-            </a:r>
+              <a:t>e: User Disconnect</a:t>
+            </a:r>
+          </a:p>
+          <a:p>
             <a:r>
               <a:rPr lang="en-US" sz="2200" dirty="0" smtClean="0">
                 <a:latin typeface="Segoe Light"/>
                 <a:cs typeface="Segoe Light"/>
               </a:rPr>
-              <a:t>: User Disconnect</a:t>
-            </a:r>
-            <a:endParaRPr lang="en-US" sz="2200" dirty="0" smtClean="0">
-              <a:latin typeface="Segoe Light"/>
-              <a:cs typeface="Segoe Light"/>
-            </a:endParaRPr>
-          </a:p>
-          <a:p>
+              <a:t>a: </a:t>
+            </a:r>
+            <a:r>
+              <a:rPr lang="en-US" sz="2200" dirty="0" err="1">
+                <a:latin typeface="Segoe Light"/>
+                <a:cs typeface="Segoe Light"/>
+              </a:rPr>
+              <a:t>XBee</a:t>
+            </a:r>
+            <a:r>
+              <a:rPr lang="en-US" sz="2200" dirty="0">
+                <a:latin typeface="Segoe Light"/>
+                <a:cs typeface="Segoe Light"/>
+              </a:rPr>
+              <a:t> </a:t>
+            </a:r>
             <a:r>
               <a:rPr lang="en-US" sz="2200" dirty="0" smtClean="0">
                 <a:latin typeface="Segoe Light"/>
                 <a:cs typeface="Segoe Light"/>
               </a:rPr>
-              <a:t>a: </a:t>
-            </a:r>
-            <a:r>
-              <a:rPr lang="en-US" sz="2200" dirty="0" err="1">
-                <a:latin typeface="Segoe Light"/>
-                <a:cs typeface="Segoe Light"/>
-              </a:rPr>
-              <a:t>XBee</a:t>
-            </a:r>
-            <a:r>
-              <a:rPr lang="en-US" sz="2200" dirty="0">
-                <a:latin typeface="Segoe Light"/>
-                <a:cs typeface="Segoe Light"/>
-              </a:rPr>
-              <a:t> </a:t>
-            </a:r>
-            <a:r>
-              <a:rPr lang="en-US" sz="2200" dirty="0" smtClean="0">
-                <a:latin typeface="Segoe Light"/>
-                <a:cs typeface="Segoe Light"/>
-              </a:rPr>
               <a:t>Disconnect</a:t>
             </a:r>
-            <a:endParaRPr lang="en-US" sz="2200" dirty="0" smtClean="0">
-              <a:latin typeface="Segoe Light"/>
-              <a:cs typeface="Segoe Light"/>
-            </a:endParaRPr>
           </a:p>
           <a:p>
             <a:endParaRPr lang="en-US" sz="2200" dirty="0" smtClean="0">
@@ -4539,19 +4517,8 @@
                 <a:latin typeface="Segoe Light"/>
                 <a:cs typeface="Segoe Light"/>
               </a:rPr>
-              <a:t>e</a:t>
-            </a:r>
-            <a:r>
-              <a:rPr lang="en-US" sz="2200" dirty="0" smtClean="0">
-                <a:latin typeface="Segoe Light"/>
-                <a:cs typeface="Segoe Light"/>
-              </a:rPr>
-              <a:t>: User slide</a:t>
-            </a:r>
-            <a:endParaRPr lang="en-US" sz="2200" dirty="0" smtClean="0">
-              <a:latin typeface="Segoe Light"/>
-              <a:cs typeface="Segoe Light"/>
-            </a:endParaRPr>
+              <a:t>e: User slide</a:t>
+            </a:r>
           </a:p>
           <a:p>
             <a:r>
@@ -5071,14 +5038,7 @@
                 <a:latin typeface="Segoe Light"/>
                 <a:cs typeface="Segoe Light"/>
               </a:rPr>
-              <a:t>e: </a:t>
-            </a:r>
-            <a:r>
-              <a:rPr lang="en-US" sz="2200" dirty="0" smtClean="0">
-                <a:latin typeface="Segoe Light"/>
-                <a:cs typeface="Segoe Light"/>
-              </a:rPr>
-              <a:t>User Confirm</a:t>
+              <a:t>e: User Confirm</a:t>
             </a:r>
             <a:endParaRPr lang="en-US" altLang="zh-CN" sz="2200" dirty="0" smtClean="0">
               <a:latin typeface="Segoe Light"/>

</xml_diff>